<commit_message>
Changed C05 CRUD appl
</commit_message>
<xml_diff>
--- a/PPT/03- Angular Service.pptx
+++ b/PPT/03- Angular Service.pptx
@@ -3400,7 +3400,7 @@
           <a:p>
             <a:fld id="{9C322094-E358-534C-BE80-A03A09CAF25D}" type="datetime1">
               <a:rPr lang="en-US" smtClean="0"/>
-              <a:t>12/22/21</a:t>
+              <a:t>1/4/22</a:t>
             </a:fld>
             <a:endParaRPr lang="en-US"/>
           </a:p>
@@ -3554,7 +3554,7 @@
           <a:p>
             <a:fld id="{9966B5DA-DEE5-8644-9F0E-DBCE6D1C3A42}" type="datetime1">
               <a:rPr lang="en-US" smtClean="0"/>
-              <a:t>12/22/21</a:t>
+              <a:t>1/4/22</a:t>
             </a:fld>
             <a:endParaRPr lang="en-US"/>
           </a:p>
@@ -3745,7 +3745,7 @@
           <a:p>
             <a:fld id="{41F97762-3263-DF49-80A6-CD151E4C6914}" type="datetime1">
               <a:rPr lang="en-US" smtClean="0"/>
-              <a:t>12/22/21</a:t>
+              <a:t>1/4/22</a:t>
             </a:fld>
             <a:endParaRPr lang="en-US"/>
           </a:p>
@@ -3870,7 +3870,7 @@
           <a:p>
             <a:fld id="{526BEC33-56F8-0444-9BA6-E82DAC05C6FD}" type="datetime1">
               <a:rPr lang="en-US" smtClean="0"/>
-              <a:t>12/22/21</a:t>
+              <a:t>1/4/22</a:t>
             </a:fld>
             <a:endParaRPr lang="en-US"/>
           </a:p>
@@ -3966,7 +3966,7 @@
           <a:p>
             <a:fld id="{B78498E7-83D0-C34B-8AF7-9656E256FA44}" type="datetime1">
               <a:rPr lang="en-US" smtClean="0"/>
-              <a:t>12/22/21</a:t>
+              <a:t>1/4/22</a:t>
             </a:fld>
             <a:endParaRPr lang="en-US"/>
           </a:p>
@@ -4084,7 +4084,7 @@
           <a:p>
             <a:fld id="{9379F80A-5E69-4003-A4CA-EECDF3CD699D}" type="datetimeFigureOut">
               <a:rPr lang="nl-NL" smtClean="0"/>
-              <a:t>22-12-2021</a:t>
+              <a:t>04-01-2022</a:t>
             </a:fld>
             <a:endParaRPr lang="nl-NL"/>
           </a:p>
@@ -4332,7 +4332,7 @@
           <a:p>
             <a:fld id="{ECAC77C6-CD6A-8242-9423-990DEB973133}" type="datetime1">
               <a:rPr lang="en-US" smtClean="0"/>
-              <a:t>12/22/21</a:t>
+              <a:t>1/4/22</a:t>
             </a:fld>
             <a:endParaRPr lang="en-US"/>
           </a:p>
@@ -4880,7 +4880,7 @@
         <p:spPr>
           <a:xfrm>
             <a:off x="1594716" y="1490805"/>
-            <a:ext cx="5900420" cy="5555752"/>
+            <a:ext cx="6952384" cy="5294142"/>
           </a:xfrm>
           <a:prstGeom prst="rect">
             <a:avLst/>
@@ -6414,11 +6414,11 @@
               <a:t>.</a:t>
             </a:r>
             <a:r>
-              <a:rPr lang="nl-NL" sz="1700" spc="-5" dirty="0">
-                <a:latin typeface="Consolas"/>
-                <a:cs typeface="Consolas"/>
-              </a:rPr>
-              <a:t>filter</a:t>
+              <a:rPr lang="nl-NL" sz="1700" spc="-5" dirty="0" err="1">
+                <a:latin typeface="Consolas"/>
+                <a:cs typeface="Consolas"/>
+              </a:rPr>
+              <a:t>find</a:t>
             </a:r>
             <a:r>
               <a:rPr sz="1700" spc="-5" dirty="0">
@@ -28586,7 +28586,7 @@
         <p:spPr>
           <a:xfrm>
             <a:off x="1672832" y="4723400"/>
-            <a:ext cx="7407668" cy="2336537"/>
+            <a:ext cx="7331468" cy="2621230"/>
           </a:xfrm>
           <a:prstGeom prst="rect">
             <a:avLst/>
@@ -28955,7 +28955,7 @@
             </a:r>
             <a:r>
               <a:rPr lang="en-US" dirty="0"/>
-              <a:t>(_ =&gt; </a:t>
+              <a:t>(cities =&gt; </a:t>
             </a:r>
             <a:r>
               <a:rPr lang="en-US" dirty="0" err="1"/>
@@ -28963,7 +28963,15 @@
             </a:r>
             <a:r>
               <a:rPr lang="en-US" dirty="0"/>
-              <a:t>('fetched cities')),</a:t>
+              <a:t>('fetched cities’, </a:t>
+            </a:r>
+            <a:r>
+              <a:rPr lang="en-US" dirty="0" err="1"/>
+              <a:t>localStorage.setItem</a:t>
+            </a:r>
+            <a:r>
+              <a:rPr lang="en-US" dirty="0"/>
+              <a:t>(cities[0]))),</a:t>
             </a:r>
           </a:p>
           <a:p>

</xml_diff>